<commit_message>
changes from pierres comments
</commit_message>
<xml_diff>
--- a/figures/states/states.pptx
+++ b/figures/states/states.pptx
@@ -289,7 +289,7 @@
           <a:p>
             <a:fld id="{3A901DC8-4A18-DA48-9C01-6AF20041B66D}" type="datetimeFigureOut">
               <a:rPr lang="en-US" smtClean="0"/>
-              <a:t>24/05/16</a:t>
+              <a:t>25/05/16</a:t>
             </a:fld>
             <a:endParaRPr lang="en-US"/>
           </a:p>
@@ -459,7 +459,7 @@
           <a:p>
             <a:fld id="{3A901DC8-4A18-DA48-9C01-6AF20041B66D}" type="datetimeFigureOut">
               <a:rPr lang="en-US" smtClean="0"/>
-              <a:t>24/05/16</a:t>
+              <a:t>25/05/16</a:t>
             </a:fld>
             <a:endParaRPr lang="en-US"/>
           </a:p>
@@ -639,7 +639,7 @@
           <a:p>
             <a:fld id="{3A901DC8-4A18-DA48-9C01-6AF20041B66D}" type="datetimeFigureOut">
               <a:rPr lang="en-US" smtClean="0"/>
-              <a:t>24/05/16</a:t>
+              <a:t>25/05/16</a:t>
             </a:fld>
             <a:endParaRPr lang="en-US"/>
           </a:p>
@@ -809,7 +809,7 @@
           <a:p>
             <a:fld id="{3A901DC8-4A18-DA48-9C01-6AF20041B66D}" type="datetimeFigureOut">
               <a:rPr lang="en-US" smtClean="0"/>
-              <a:t>24/05/16</a:t>
+              <a:t>25/05/16</a:t>
             </a:fld>
             <a:endParaRPr lang="en-US"/>
           </a:p>
@@ -1055,7 +1055,7 @@
           <a:p>
             <a:fld id="{3A901DC8-4A18-DA48-9C01-6AF20041B66D}" type="datetimeFigureOut">
               <a:rPr lang="en-US" smtClean="0"/>
-              <a:t>24/05/16</a:t>
+              <a:t>25/05/16</a:t>
             </a:fld>
             <a:endParaRPr lang="en-US"/>
           </a:p>
@@ -1343,7 +1343,7 @@
           <a:p>
             <a:fld id="{3A901DC8-4A18-DA48-9C01-6AF20041B66D}" type="datetimeFigureOut">
               <a:rPr lang="en-US" smtClean="0"/>
-              <a:t>24/05/16</a:t>
+              <a:t>25/05/16</a:t>
             </a:fld>
             <a:endParaRPr lang="en-US"/>
           </a:p>
@@ -1765,7 +1765,7 @@
           <a:p>
             <a:fld id="{3A901DC8-4A18-DA48-9C01-6AF20041B66D}" type="datetimeFigureOut">
               <a:rPr lang="en-US" smtClean="0"/>
-              <a:t>24/05/16</a:t>
+              <a:t>25/05/16</a:t>
             </a:fld>
             <a:endParaRPr lang="en-US"/>
           </a:p>
@@ -1883,7 +1883,7 @@
           <a:p>
             <a:fld id="{3A901DC8-4A18-DA48-9C01-6AF20041B66D}" type="datetimeFigureOut">
               <a:rPr lang="en-US" smtClean="0"/>
-              <a:t>24/05/16</a:t>
+              <a:t>25/05/16</a:t>
             </a:fld>
             <a:endParaRPr lang="en-US"/>
           </a:p>
@@ -1978,7 +1978,7 @@
           <a:p>
             <a:fld id="{3A901DC8-4A18-DA48-9C01-6AF20041B66D}" type="datetimeFigureOut">
               <a:rPr lang="en-US" smtClean="0"/>
-              <a:t>24/05/16</a:t>
+              <a:t>25/05/16</a:t>
             </a:fld>
             <a:endParaRPr lang="en-US"/>
           </a:p>
@@ -2255,7 +2255,7 @@
           <a:p>
             <a:fld id="{3A901DC8-4A18-DA48-9C01-6AF20041B66D}" type="datetimeFigureOut">
               <a:rPr lang="en-US" smtClean="0"/>
-              <a:t>24/05/16</a:t>
+              <a:t>25/05/16</a:t>
             </a:fld>
             <a:endParaRPr lang="en-US"/>
           </a:p>
@@ -2508,7 +2508,7 @@
           <a:p>
             <a:fld id="{3A901DC8-4A18-DA48-9C01-6AF20041B66D}" type="datetimeFigureOut">
               <a:rPr lang="en-US" smtClean="0"/>
-              <a:t>24/05/16</a:t>
+              <a:t>25/05/16</a:t>
             </a:fld>
             <a:endParaRPr lang="en-US"/>
           </a:p>
@@ -2721,7 +2721,7 @@
           <a:p>
             <a:fld id="{3A901DC8-4A18-DA48-9C01-6AF20041B66D}" type="datetimeFigureOut">
               <a:rPr lang="en-US" smtClean="0"/>
-              <a:t>24/05/16</a:t>
+              <a:t>25/05/16</a:t>
             </a:fld>
             <a:endParaRPr lang="en-US"/>
           </a:p>
@@ -3642,7 +3642,7 @@
             <a:pPr algn="ctr"/>
             <a:r>
               <a:rPr lang="en-US" sz="2800" b="1" dirty="0" smtClean="0"/>
-              <a:t>0.38</a:t>
+              <a:t>0.39</a:t>
             </a:r>
             <a:endParaRPr lang="en-US" sz="2800" b="1" dirty="0"/>
           </a:p>
@@ -3684,7 +3684,7 @@
             <a:pPr algn="ctr"/>
             <a:r>
               <a:rPr lang="en-US" sz="2800" dirty="0" smtClean="0"/>
-              <a:t>0.27</a:t>
+              <a:t>0.28</a:t>
             </a:r>
             <a:endParaRPr lang="en-US" sz="2800" dirty="0"/>
           </a:p>
@@ -3726,7 +3726,7 @@
             <a:pPr algn="ctr"/>
             <a:r>
               <a:rPr lang="en-US" sz="2800" b="1" dirty="0" smtClean="0"/>
-              <a:t>0.35</a:t>
+              <a:t>0.36</a:t>
             </a:r>
             <a:endParaRPr lang="en-US" sz="2800" b="1" dirty="0"/>
           </a:p>
@@ -4440,7 +4440,7 @@
             <a:pPr algn="ctr"/>
             <a:r>
               <a:rPr lang="en-US" sz="2800" b="1" dirty="0" smtClean="0"/>
-              <a:t>0.46</a:t>
+              <a:t>0.47</a:t>
             </a:r>
             <a:endParaRPr lang="en-US" sz="2800" b="1" dirty="0"/>
           </a:p>
@@ -4482,7 +4482,7 @@
             <a:pPr algn="ctr"/>
             <a:r>
               <a:rPr lang="en-US" sz="2800" dirty="0" smtClean="0"/>
-              <a:t>0.32</a:t>
+              <a:t>0.33</a:t>
             </a:r>
             <a:endParaRPr lang="en-US" sz="2800" dirty="0"/>
           </a:p>

</xml_diff>